<commit_message>
updated person, image, dtos
</commit_message>
<xml_diff>
--- a/Egzaminas.pptx
+++ b/Egzaminas.pptx
@@ -7985,8 +7985,8 @@
         </p:nvSpPr>
         <p:spPr>
           <a:xfrm>
-            <a:off x="594000" y="751680"/>
-            <a:ext cx="10998720" cy="5714640"/>
+            <a:off x="177553" y="751680"/>
+            <a:ext cx="11415167" cy="5714640"/>
           </a:xfrm>
           <a:prstGeom prst="rect">
             <a:avLst/>
@@ -8030,32 +8030,29 @@
                 <a:latin typeface="Arial"/>
                 <a:ea typeface="Arial"/>
               </a:rPr>
-              <a:t>Eiga:</a:t>
+              <a:t>	Vartotojas turi galėti užsiregistruoti.</a:t>
             </a:r>
-            <a:endParaRPr lang="lt-LT" sz="1200" b="0" strike="noStrike" spc="-1" dirty="0">
-              <a:latin typeface="Arial"/>
-            </a:endParaRPr>
-          </a:p>
-          <a:p>
-            <a:pPr>
-              <a:lnSpc>
-                <a:spcPct val="150000"/>
-              </a:lnSpc>
-              <a:tabLst>
-                <a:tab pos="0" algn="l"/>
-              </a:tabLst>
-            </a:pPr>
             <a:r>
-              <a:rPr lang="lt-LT" sz="1200" b="0" strike="noStrike" spc="-1" dirty="0">
+              <a:rPr lang="en-US" sz="1200" b="0" strike="noStrike" spc="-1" dirty="0">
                 <a:solidFill>
                   <a:srgbClr val="000000"/>
                 </a:solidFill>
                 <a:latin typeface="Arial"/>
                 <a:ea typeface="Arial"/>
               </a:rPr>
-              <a:t>	Vartotojas turi galėti užsiregistruoti.</a:t>
+              <a:t> </a:t>
             </a:r>
-            <a:endParaRPr lang="lt-LT" sz="1200" b="0" strike="noStrike" spc="-1" dirty="0">
+            <a:r>
+              <a:rPr lang="en-US" sz="1100" b="0" i="0" u="none" strike="noStrike" dirty="0">
+                <a:solidFill>
+                  <a:srgbClr val="000000"/>
+                </a:solidFill>
+                <a:effectLst/>
+                <a:latin typeface="Patrick Hand" panose="00000500000000000000" pitchFamily="2" charset="0"/>
+              </a:rPr>
+              <a:t>✅</a:t>
+            </a:r>
+            <a:endParaRPr lang="lt-LT" sz="1100" b="0" strike="noStrike" spc="-1" dirty="0">
               <a:latin typeface="Arial"/>
             </a:endParaRPr>
           </a:p>
@@ -8078,6 +8075,16 @@
               </a:rPr>
               <a:t>	Užsiregistravus sukuriamas User'is su default'ine role 'User'.</a:t>
             </a:r>
+            <a:r>
+              <a:rPr lang="en-US" sz="1200" b="0" i="0" u="none" strike="noStrike" dirty="0">
+                <a:solidFill>
+                  <a:srgbClr val="000000"/>
+                </a:solidFill>
+                <a:effectLst/>
+                <a:latin typeface="Patrick Hand" panose="00000500000000000000" pitchFamily="2" charset="0"/>
+              </a:rPr>
+              <a:t> ✅</a:t>
+            </a:r>
             <a:endParaRPr lang="lt-LT" sz="1200" b="0" strike="noStrike" spc="-1" dirty="0">
               <a:latin typeface="Arial"/>
             </a:endParaRPr>
@@ -8099,7 +8106,26 @@
                 <a:latin typeface="Arial"/>
                 <a:ea typeface="Arial"/>
               </a:rPr>
-              <a:t>	Useris turi galėti sukelti apie save informaciją, kurioje VISI laukai privalomi(Žmogaus informacija), vartotojas neturi galėti sukelti informacijos apie daugiau nei vieną žmogų.</a:t>
+              <a:t>	Useris turi galėti sukelti apie save informaciją, kurioje VISI laukai privalomi(Žmogaus informacija), </a:t>
+            </a:r>
+            <a:br>
+              <a:rPr lang="en-US" sz="1200" b="0" strike="noStrike" spc="-1" dirty="0">
+                <a:solidFill>
+                  <a:srgbClr val="000000"/>
+                </a:solidFill>
+                <a:latin typeface="Arial"/>
+                <a:ea typeface="Arial"/>
+              </a:rPr>
+            </a:br>
+            <a:r>
+              <a:rPr lang="lt-LT" sz="1200" b="0" strike="noStrike" spc="-1" dirty="0">
+                <a:solidFill>
+                  <a:srgbClr val="000000"/>
+                </a:solidFill>
+                <a:latin typeface="Arial"/>
+                <a:ea typeface="Arial"/>
+              </a:rPr>
+              <a:t>vartotojas neturi galėti sukelti informacijos apie daugiau nei vieną žmogų.</a:t>
             </a:r>
             <a:endParaRPr lang="lt-LT" sz="1200" b="0" strike="noStrike" spc="-1" dirty="0">
               <a:latin typeface="Arial"/>
@@ -8124,6 +8150,23 @@
               </a:rPr>
               <a:t>	Turi būti skirtingi endpoint atnaujint KIEKVIENĄ iš laukų, pvz.: Vardą, asmens kodą, telefono numerį, miestą(negalima atnaujinti į tuščią lauką arba whitespace)</a:t>
             </a:r>
+            <a:endParaRPr lang="en-US" sz="1200" b="0" strike="noStrike" spc="-1" dirty="0">
+              <a:solidFill>
+                <a:srgbClr val="000000"/>
+              </a:solidFill>
+              <a:latin typeface="Arial"/>
+              <a:ea typeface="Arial"/>
+            </a:endParaRPr>
+          </a:p>
+          <a:p>
+            <a:pPr>
+              <a:lnSpc>
+                <a:spcPct val="150000"/>
+              </a:lnSpc>
+              <a:tabLst>
+                <a:tab pos="0" algn="l"/>
+              </a:tabLst>
+            </a:pPr>
             <a:endParaRPr lang="lt-LT" sz="1200" b="0" strike="noStrike" spc="-1" dirty="0">
               <a:latin typeface="Arial"/>
             </a:endParaRPr>
@@ -8145,9 +8188,19 @@
                 <a:latin typeface="Arial"/>
                 <a:ea typeface="Arial"/>
               </a:rPr>
-              <a:t>	Pildant žmogaus informaciją žmogų turi būti privaloma įkelti profilio nuotrauką, jos dydis turi būti sumažintas iki 200x200(jeigu nuotrauka per maža tai ją ištemps iki 200x200).</a:t>
+              <a:t>	Pildant žmogaus informaciją žmogų turi būti privaloma įkelti profilio nuotrauką, jos dydis turi būti sumažintas iki </a:t>
             </a:r>
-            <a:endParaRPr lang="lt-LT" sz="1200" b="0" strike="noStrike" spc="-1" dirty="0">
+            <a:r>
+              <a:rPr lang="lt-LT" sz="1000" b="0" strike="noStrike" spc="-1" dirty="0">
+                <a:solidFill>
+                  <a:srgbClr val="000000"/>
+                </a:solidFill>
+                <a:latin typeface="Arial"/>
+                <a:ea typeface="Arial"/>
+              </a:rPr>
+              <a:t>200x200(jeigu nuotrauka per maža tai ją ištemps iki 200x200).</a:t>
+            </a:r>
+            <a:endParaRPr lang="lt-LT" sz="1000" b="0" strike="noStrike" spc="-1" dirty="0">
               <a:latin typeface="Arial"/>
             </a:endParaRPr>
           </a:p>
@@ -8168,8 +8221,52 @@
                 <a:latin typeface="Arial"/>
                 <a:ea typeface="Arial"/>
               </a:rPr>
-              <a:t>	Turi būti galimybė gauti visą informaciją apie įkeltą žmogų pagal jo ID(nuotrauka grąžinama byte masyvu).</a:t>
+              <a:t>	</a:t>
             </a:r>
+            <a:endParaRPr lang="en-US" sz="1200" b="0" strike="noStrike" spc="-1" dirty="0">
+              <a:solidFill>
+                <a:srgbClr val="000000"/>
+              </a:solidFill>
+              <a:latin typeface="Arial"/>
+              <a:ea typeface="Arial"/>
+            </a:endParaRPr>
+          </a:p>
+          <a:p>
+            <a:pPr>
+              <a:lnSpc>
+                <a:spcPct val="150000"/>
+              </a:lnSpc>
+              <a:tabLst>
+                <a:tab pos="0" algn="l"/>
+              </a:tabLst>
+            </a:pPr>
+            <a:r>
+              <a:rPr lang="lt-LT" sz="1200" b="0" strike="noStrike" spc="-1" dirty="0">
+                <a:solidFill>
+                  <a:srgbClr val="000000"/>
+                </a:solidFill>
+                <a:latin typeface="Arial"/>
+                <a:ea typeface="Arial"/>
+              </a:rPr>
+              <a:t>Turi būti galimybė gauti visą informaciją apie įkeltą žmogų pagal jo ID(nuotrauka grąžinama byte masyvu).</a:t>
+            </a:r>
+            <a:endParaRPr lang="en-US" sz="1200" b="0" strike="noStrike" spc="-1" dirty="0">
+              <a:solidFill>
+                <a:srgbClr val="000000"/>
+              </a:solidFill>
+              <a:latin typeface="Arial"/>
+              <a:ea typeface="Arial"/>
+            </a:endParaRPr>
+          </a:p>
+          <a:p>
+            <a:pPr>
+              <a:lnSpc>
+                <a:spcPct val="150000"/>
+              </a:lnSpc>
+              <a:tabLst>
+                <a:tab pos="0" algn="l"/>
+              </a:tabLst>
+            </a:pPr>
             <a:endParaRPr lang="lt-LT" sz="1200" b="0" strike="noStrike" spc="-1" dirty="0">
               <a:latin typeface="Arial"/>
             </a:endParaRPr>
@@ -8193,6 +8290,23 @@
               </a:rPr>
               <a:t>	Useris neturi galėti atnaujint ne savo žmogaus informacijos, palengvinimo dėlėi sakykime, kad su kiekvienu requestu "iš frontend" ateis User'io ID, tačiau rekomendacija primti User’io ID iš JWT token claims (autorizuoto userio).</a:t>
             </a:r>
+            <a:endParaRPr lang="en-US" sz="1200" b="0" strike="noStrike" spc="-1" dirty="0">
+              <a:solidFill>
+                <a:srgbClr val="000000"/>
+              </a:solidFill>
+              <a:latin typeface="Arial"/>
+              <a:ea typeface="Arial"/>
+            </a:endParaRPr>
+          </a:p>
+          <a:p>
+            <a:pPr>
+              <a:lnSpc>
+                <a:spcPct val="150000"/>
+              </a:lnSpc>
+              <a:tabLst>
+                <a:tab pos="0" algn="l"/>
+              </a:tabLst>
+            </a:pPr>
             <a:endParaRPr lang="lt-LT" sz="1200" b="0" strike="noStrike" spc="-1" dirty="0">
               <a:latin typeface="Arial"/>
             </a:endParaRPr>

</xml_diff>